<commit_message>
Latest changes in advanced presentation
</commit_message>
<xml_diff>
--- a/C# Advanced.pptx
+++ b/C# Advanced.pptx
@@ -5,7 +5,7 @@
     <p:sldMasterId id="2147484098" r:id="rId1"/>
   </p:sldMasterIdLst>
   <p:notesMasterIdLst>
-    <p:notesMasterId r:id="rId22"/>
+    <p:notesMasterId r:id="rId26"/>
   </p:notesMasterIdLst>
   <p:sldIdLst>
     <p:sldId id="268" r:id="rId2"/>
@@ -28,6 +28,10 @@
     <p:sldId id="274" r:id="rId19"/>
     <p:sldId id="275" r:id="rId20"/>
     <p:sldId id="276" r:id="rId21"/>
+    <p:sldId id="277" r:id="rId22"/>
+    <p:sldId id="278" r:id="rId23"/>
+    <p:sldId id="279" r:id="rId24"/>
+    <p:sldId id="280" r:id="rId25"/>
   </p:sldIdLst>
   <p:sldSz cx="12192000" cy="6858000"/>
   <p:notesSz cx="6858000" cy="9144000"/>
@@ -216,7 +220,7 @@
           <a:p>
             <a:fld id="{3CFF4BCD-A327-491B-9BBE-6CF8AEB95D7F}" type="datetimeFigureOut">
               <a:rPr lang="bg-BG" smtClean="0"/>
-              <a:t>12.6.2024 г.</a:t>
+              <a:t>14.6.2024 г.</a:t>
             </a:fld>
             <a:endParaRPr lang="bg-BG"/>
           </a:p>
@@ -1214,7 +1218,7 @@
           <a:p>
             <a:fld id="{A795E479-C003-4F68-8D57-D7139EEC14A6}" type="datetimeFigureOut">
               <a:rPr lang="bg-BG" smtClean="0"/>
-              <a:t>12.6.2024 г.</a:t>
+              <a:t>14.6.2024 г.</a:t>
             </a:fld>
             <a:endParaRPr lang="bg-BG"/>
           </a:p>
@@ -2334,7 +2338,7 @@
           <a:p>
             <a:fld id="{A795E479-C003-4F68-8D57-D7139EEC14A6}" type="datetimeFigureOut">
               <a:rPr lang="bg-BG" smtClean="0"/>
-              <a:t>12.6.2024 г.</a:t>
+              <a:t>14.6.2024 г.</a:t>
             </a:fld>
             <a:endParaRPr lang="bg-BG"/>
           </a:p>
@@ -3345,7 +3349,7 @@
           <a:p>
             <a:fld id="{A795E479-C003-4F68-8D57-D7139EEC14A6}" type="datetimeFigureOut">
               <a:rPr lang="bg-BG" smtClean="0"/>
-              <a:t>12.6.2024 г.</a:t>
+              <a:t>14.6.2024 г.</a:t>
             </a:fld>
             <a:endParaRPr lang="bg-BG"/>
           </a:p>
@@ -4515,7 +4519,7 @@
           <a:p>
             <a:fld id="{A795E479-C003-4F68-8D57-D7139EEC14A6}" type="datetimeFigureOut">
               <a:rPr lang="bg-BG" smtClean="0"/>
-              <a:t>12.6.2024 г.</a:t>
+              <a:t>14.6.2024 г.</a:t>
             </a:fld>
             <a:endParaRPr lang="bg-BG"/>
           </a:p>
@@ -5576,7 +5580,7 @@
           <a:p>
             <a:fld id="{A795E479-C003-4F68-8D57-D7139EEC14A6}" type="datetimeFigureOut">
               <a:rPr lang="bg-BG" smtClean="0"/>
-              <a:t>12.6.2024 г.</a:t>
+              <a:t>14.6.2024 г.</a:t>
             </a:fld>
             <a:endParaRPr lang="bg-BG"/>
           </a:p>
@@ -6222,7 +6226,7 @@
           <a:p>
             <a:fld id="{A795E479-C003-4F68-8D57-D7139EEC14A6}" type="datetimeFigureOut">
               <a:rPr lang="bg-BG" smtClean="0"/>
-              <a:t>12.6.2024 г.</a:t>
+              <a:t>14.6.2024 г.</a:t>
             </a:fld>
             <a:endParaRPr lang="bg-BG"/>
           </a:p>
@@ -7069,7 +7073,7 @@
           <a:p>
             <a:fld id="{A795E479-C003-4F68-8D57-D7139EEC14A6}" type="datetimeFigureOut">
               <a:rPr lang="bg-BG" smtClean="0"/>
-              <a:t>12.6.2024 г.</a:t>
+              <a:t>14.6.2024 г.</a:t>
             </a:fld>
             <a:endParaRPr lang="bg-BG"/>
           </a:p>
@@ -7244,7 +7248,7 @@
           <a:p>
             <a:fld id="{A795E479-C003-4F68-8D57-D7139EEC14A6}" type="datetimeFigureOut">
               <a:rPr lang="bg-BG" smtClean="0"/>
-              <a:t>12.6.2024 г.</a:t>
+              <a:t>14.6.2024 г.</a:t>
             </a:fld>
             <a:endParaRPr lang="bg-BG"/>
           </a:p>
@@ -8242,7 +8246,7 @@
           <a:p>
             <a:fld id="{A795E479-C003-4F68-8D57-D7139EEC14A6}" type="datetimeFigureOut">
               <a:rPr lang="bg-BG" smtClean="0"/>
-              <a:t>12.6.2024 г.</a:t>
+              <a:t>14.6.2024 г.</a:t>
             </a:fld>
             <a:endParaRPr lang="bg-BG"/>
           </a:p>
@@ -8448,7 +8452,7 @@
           <a:p>
             <a:fld id="{A795E479-C003-4F68-8D57-D7139EEC14A6}" type="datetimeFigureOut">
               <a:rPr lang="bg-BG" smtClean="0"/>
-              <a:t>12.6.2024 г.</a:t>
+              <a:t>14.6.2024 г.</a:t>
             </a:fld>
             <a:endParaRPr lang="bg-BG"/>
           </a:p>
@@ -9510,7 +9514,7 @@
           <a:p>
             <a:fld id="{A795E479-C003-4F68-8D57-D7139EEC14A6}" type="datetimeFigureOut">
               <a:rPr lang="bg-BG" smtClean="0"/>
-              <a:t>12.6.2024 г.</a:t>
+              <a:t>14.6.2024 г.</a:t>
             </a:fld>
             <a:endParaRPr lang="bg-BG"/>
           </a:p>
@@ -9782,7 +9786,7 @@
           <a:p>
             <a:fld id="{A795E479-C003-4F68-8D57-D7139EEC14A6}" type="datetimeFigureOut">
               <a:rPr lang="bg-BG" smtClean="0"/>
-              <a:t>12.6.2024 г.</a:t>
+              <a:t>14.6.2024 г.</a:t>
             </a:fld>
             <a:endParaRPr lang="bg-BG"/>
           </a:p>
@@ -10164,7 +10168,7 @@
           <a:p>
             <a:fld id="{A795E479-C003-4F68-8D57-D7139EEC14A6}" type="datetimeFigureOut">
               <a:rPr lang="bg-BG" smtClean="0"/>
-              <a:t>12.6.2024 г.</a:t>
+              <a:t>14.6.2024 г.</a:t>
             </a:fld>
             <a:endParaRPr lang="bg-BG"/>
           </a:p>
@@ -10282,7 +10286,7 @@
           <a:p>
             <a:fld id="{A795E479-C003-4F68-8D57-D7139EEC14A6}" type="datetimeFigureOut">
               <a:rPr lang="bg-BG" smtClean="0"/>
-              <a:t>12.6.2024 г.</a:t>
+              <a:t>14.6.2024 г.</a:t>
             </a:fld>
             <a:endParaRPr lang="bg-BG"/>
           </a:p>
@@ -10377,7 +10381,7 @@
           <a:p>
             <a:fld id="{A795E479-C003-4F68-8D57-D7139EEC14A6}" type="datetimeFigureOut">
               <a:rPr lang="bg-BG" smtClean="0"/>
-              <a:t>12.6.2024 г.</a:t>
+              <a:t>14.6.2024 г.</a:t>
             </a:fld>
             <a:endParaRPr lang="bg-BG"/>
           </a:p>
@@ -11486,7 +11490,7 @@
           <a:p>
             <a:fld id="{A795E479-C003-4F68-8D57-D7139EEC14A6}" type="datetimeFigureOut">
               <a:rPr lang="bg-BG" smtClean="0"/>
-              <a:t>12.6.2024 г.</a:t>
+              <a:t>14.6.2024 г.</a:t>
             </a:fld>
             <a:endParaRPr lang="bg-BG"/>
           </a:p>
@@ -12619,7 +12623,7 @@
           <a:p>
             <a:fld id="{A795E479-C003-4F68-8D57-D7139EEC14A6}" type="datetimeFigureOut">
               <a:rPr lang="bg-BG" smtClean="0"/>
-              <a:t>12.6.2024 г.</a:t>
+              <a:t>14.6.2024 г.</a:t>
             </a:fld>
             <a:endParaRPr lang="bg-BG"/>
           </a:p>
@@ -13647,7 +13651,7 @@
           <a:p>
             <a:fld id="{A795E479-C003-4F68-8D57-D7139EEC14A6}" type="datetimeFigureOut">
               <a:rPr lang="bg-BG" smtClean="0"/>
-              <a:t>12.6.2024 г.</a:t>
+              <a:t>14.6.2024 г.</a:t>
             </a:fld>
             <a:endParaRPr lang="bg-BG"/>
           </a:p>
@@ -19065,6 +19069,1405 @@
     <p:extLst>
       <p:ext uri="{BB962C8B-B14F-4D97-AF65-F5344CB8AC3E}">
         <p14:creationId xmlns:p14="http://schemas.microsoft.com/office/powerpoint/2010/main" val="3372546716"/>
+      </p:ext>
+    </p:extLst>
+  </p:cSld>
+  <p:clrMapOvr>
+    <a:masterClrMapping/>
+  </p:clrMapOvr>
+</p:sld>
+</file>
+
+<file path=ppt/slides/slide21.xml><?xml version="1.0" encoding="utf-8"?>
+<p:sld xmlns:a="http://schemas.openxmlformats.org/drawingml/2006/main" xmlns:r="http://schemas.openxmlformats.org/officeDocument/2006/relationships" xmlns:p="http://schemas.openxmlformats.org/presentationml/2006/main">
+  <p:cSld>
+    <p:spTree>
+      <p:nvGrpSpPr>
+        <p:cNvPr id="1" name=""/>
+        <p:cNvGrpSpPr/>
+        <p:nvPr/>
+      </p:nvGrpSpPr>
+      <p:grpSpPr>
+        <a:xfrm>
+          <a:off x="0" y="0"/>
+          <a:ext cx="0" cy="0"/>
+          <a:chOff x="0" y="0"/>
+          <a:chExt cx="0" cy="0"/>
+        </a:xfrm>
+      </p:grpSpPr>
+      <p:sp>
+        <p:nvSpPr>
+          <p:cNvPr id="2" name="Title 1">
+            <a:extLst>
+              <a:ext uri="{FF2B5EF4-FFF2-40B4-BE49-F238E27FC236}">
+                <a16:creationId xmlns:a16="http://schemas.microsoft.com/office/drawing/2014/main" id="{740472EF-F836-F9F9-B1D5-16694A523883}"/>
+              </a:ext>
+            </a:extLst>
+          </p:cNvPr>
+          <p:cNvSpPr>
+            <a:spLocks noGrp="1"/>
+          </p:cNvSpPr>
+          <p:nvPr>
+            <p:ph type="title"/>
+          </p:nvPr>
+        </p:nvSpPr>
+        <p:spPr/>
+        <p:txBody>
+          <a:bodyPr/>
+          <a:lstStyle/>
+          <a:p>
+            <a:pPr algn="ctr"/>
+            <a:r>
+              <a:rPr lang="en-US" dirty="0">
+                <a:latin typeface="Arial" panose="020B0604020202020204" pitchFamily="34" charset="0"/>
+                <a:cs typeface="Arial" panose="020B0604020202020204" pitchFamily="34" charset="0"/>
+              </a:rPr>
+              <a:t>C# Jagged arrays</a:t>
+            </a:r>
+            <a:endParaRPr lang="bg-BG" dirty="0">
+              <a:latin typeface="Arial" panose="020B0604020202020204" pitchFamily="34" charset="0"/>
+              <a:cs typeface="Arial" panose="020B0604020202020204" pitchFamily="34" charset="0"/>
+            </a:endParaRPr>
+          </a:p>
+        </p:txBody>
+      </p:sp>
+      <p:sp>
+        <p:nvSpPr>
+          <p:cNvPr id="3" name="Content Placeholder 2">
+            <a:extLst>
+              <a:ext uri="{FF2B5EF4-FFF2-40B4-BE49-F238E27FC236}">
+                <a16:creationId xmlns:a16="http://schemas.microsoft.com/office/drawing/2014/main" id="{8514773A-CBBC-C8A2-800E-BB44800A3DF7}"/>
+              </a:ext>
+            </a:extLst>
+          </p:cNvPr>
+          <p:cNvSpPr>
+            <a:spLocks noGrp="1"/>
+          </p:cNvSpPr>
+          <p:nvPr>
+            <p:ph idx="1"/>
+          </p:nvPr>
+        </p:nvSpPr>
+        <p:spPr>
+          <a:xfrm>
+            <a:off x="1154954" y="2603500"/>
+            <a:ext cx="10205023" cy="3879678"/>
+          </a:xfrm>
+        </p:spPr>
+        <p:txBody>
+          <a:bodyPr/>
+          <a:lstStyle/>
+          <a:p>
+            <a:r>
+              <a:rPr lang="bg-BG" dirty="0">
+                <a:latin typeface="Arial" panose="020B0604020202020204" pitchFamily="34" charset="0"/>
+                <a:cs typeface="Arial" panose="020B0604020202020204" pitchFamily="34" charset="0"/>
+              </a:rPr>
+              <a:t>Назъбените (</a:t>
+            </a:r>
+            <a:r>
+              <a:rPr lang="en-US" dirty="0">
+                <a:latin typeface="Arial" panose="020B0604020202020204" pitchFamily="34" charset="0"/>
+                <a:cs typeface="Arial" panose="020B0604020202020204" pitchFamily="34" charset="0"/>
+              </a:rPr>
+              <a:t>Jagged</a:t>
+            </a:r>
+            <a:r>
+              <a:rPr lang="bg-BG" dirty="0">
+                <a:latin typeface="Arial" panose="020B0604020202020204" pitchFamily="34" charset="0"/>
+                <a:cs typeface="Arial" panose="020B0604020202020204" pitchFamily="34" charset="0"/>
+              </a:rPr>
+              <a:t>)</a:t>
+            </a:r>
+            <a:r>
+              <a:rPr lang="en-US" dirty="0">
+                <a:latin typeface="Arial" panose="020B0604020202020204" pitchFamily="34" charset="0"/>
+                <a:cs typeface="Arial" panose="020B0604020202020204" pitchFamily="34" charset="0"/>
+              </a:rPr>
+              <a:t> </a:t>
+            </a:r>
+            <a:r>
+              <a:rPr lang="bg-BG" dirty="0">
+                <a:latin typeface="Arial" panose="020B0604020202020204" pitchFamily="34" charset="0"/>
+                <a:cs typeface="Arial" panose="020B0604020202020204" pitchFamily="34" charset="0"/>
+              </a:rPr>
+              <a:t>масиви са отново многомерни масиви или така нареченият масив от масиви, които обаче имат различна размерност.</a:t>
+            </a:r>
+          </a:p>
+          <a:p>
+            <a:endParaRPr lang="bg-BG" dirty="0">
+              <a:latin typeface="Arial" panose="020B0604020202020204" pitchFamily="34" charset="0"/>
+              <a:cs typeface="Arial" panose="020B0604020202020204" pitchFamily="34" charset="0"/>
+            </a:endParaRPr>
+          </a:p>
+          <a:p>
+            <a:endParaRPr lang="bg-BG" dirty="0"/>
+          </a:p>
+        </p:txBody>
+      </p:sp>
+      <p:pic>
+        <p:nvPicPr>
+          <p:cNvPr id="5" name="Picture 4" descr="A green and white grid&#10;&#10;Description automatically generated with medium confidence">
+            <a:extLst>
+              <a:ext uri="{FF2B5EF4-FFF2-40B4-BE49-F238E27FC236}">
+                <a16:creationId xmlns:a16="http://schemas.microsoft.com/office/drawing/2014/main" id="{80F317AE-EC73-097D-85D4-7D21AFE343AC}"/>
+              </a:ext>
+            </a:extLst>
+          </p:cNvPr>
+          <p:cNvPicPr>
+            <a:picLocks noChangeAspect="1"/>
+          </p:cNvPicPr>
+          <p:nvPr/>
+        </p:nvPicPr>
+        <p:blipFill>
+          <a:blip r:embed="rId2">
+            <a:extLst>
+              <a:ext uri="{28A0092B-C50C-407E-A947-70E740481C1C}">
+                <a14:useLocalDpi xmlns:a14="http://schemas.microsoft.com/office/drawing/2010/main" val="0"/>
+              </a:ext>
+            </a:extLst>
+          </a:blip>
+          <a:stretch>
+            <a:fillRect/>
+          </a:stretch>
+        </p:blipFill>
+        <p:spPr>
+          <a:xfrm>
+            <a:off x="2577963" y="3429000"/>
+            <a:ext cx="6262289" cy="2458730"/>
+          </a:xfrm>
+          <a:prstGeom prst="rect">
+            <a:avLst/>
+          </a:prstGeom>
+        </p:spPr>
+      </p:pic>
+    </p:spTree>
+    <p:extLst>
+      <p:ext uri="{BB962C8B-B14F-4D97-AF65-F5344CB8AC3E}">
+        <p14:creationId xmlns:p14="http://schemas.microsoft.com/office/powerpoint/2010/main" val="930653579"/>
+      </p:ext>
+    </p:extLst>
+  </p:cSld>
+  <p:clrMapOvr>
+    <a:masterClrMapping/>
+  </p:clrMapOvr>
+</p:sld>
+</file>
+
+<file path=ppt/slides/slide22.xml><?xml version="1.0" encoding="utf-8"?>
+<p:sld xmlns:a="http://schemas.openxmlformats.org/drawingml/2006/main" xmlns:r="http://schemas.openxmlformats.org/officeDocument/2006/relationships" xmlns:p="http://schemas.openxmlformats.org/presentationml/2006/main">
+  <p:cSld>
+    <p:spTree>
+      <p:nvGrpSpPr>
+        <p:cNvPr id="1" name=""/>
+        <p:cNvGrpSpPr/>
+        <p:nvPr/>
+      </p:nvGrpSpPr>
+      <p:grpSpPr>
+        <a:xfrm>
+          <a:off x="0" y="0"/>
+          <a:ext cx="0" cy="0"/>
+          <a:chOff x="0" y="0"/>
+          <a:chExt cx="0" cy="0"/>
+        </a:xfrm>
+      </p:grpSpPr>
+      <p:sp>
+        <p:nvSpPr>
+          <p:cNvPr id="2" name="Title 1">
+            <a:extLst>
+              <a:ext uri="{FF2B5EF4-FFF2-40B4-BE49-F238E27FC236}">
+                <a16:creationId xmlns:a16="http://schemas.microsoft.com/office/drawing/2014/main" id="{5D4BBD78-DE77-D242-CF29-001CF64EFEF6}"/>
+              </a:ext>
+            </a:extLst>
+          </p:cNvPr>
+          <p:cNvSpPr>
+            <a:spLocks noGrp="1"/>
+          </p:cNvSpPr>
+          <p:nvPr>
+            <p:ph type="title"/>
+          </p:nvPr>
+        </p:nvSpPr>
+        <p:spPr>
+          <a:xfrm>
+            <a:off x="1426801" y="907766"/>
+            <a:ext cx="8761413" cy="1028126"/>
+          </a:xfrm>
+        </p:spPr>
+        <p:txBody>
+          <a:bodyPr/>
+          <a:lstStyle/>
+          <a:p>
+            <a:pPr algn="ctr"/>
+            <a:r>
+              <a:rPr lang="bg-BG" dirty="0">
+                <a:latin typeface="Arial" panose="020B0604020202020204" pitchFamily="34" charset="0"/>
+                <a:cs typeface="Arial" panose="020B0604020202020204" pitchFamily="34" charset="0"/>
+              </a:rPr>
+              <a:t>Създаване</a:t>
+            </a:r>
+            <a:r>
+              <a:rPr lang="en-US" dirty="0">
+                <a:latin typeface="Arial" panose="020B0604020202020204" pitchFamily="34" charset="0"/>
+                <a:cs typeface="Arial" panose="020B0604020202020204" pitchFamily="34" charset="0"/>
+              </a:rPr>
+              <a:t> </a:t>
+            </a:r>
+            <a:r>
+              <a:rPr lang="bg-BG" dirty="0">
+                <a:latin typeface="Arial" panose="020B0604020202020204" pitchFamily="34" charset="0"/>
+                <a:cs typeface="Arial" panose="020B0604020202020204" pitchFamily="34" charset="0"/>
+              </a:rPr>
+              <a:t>и инициализация на </a:t>
+            </a:r>
+            <a:r>
+              <a:rPr lang="en-US" dirty="0">
+                <a:latin typeface="Arial" panose="020B0604020202020204" pitchFamily="34" charset="0"/>
+                <a:cs typeface="Arial" panose="020B0604020202020204" pitchFamily="34" charset="0"/>
+              </a:rPr>
+              <a:t>jagged array (</a:t>
+            </a:r>
+            <a:r>
+              <a:rPr lang="bg-BG" dirty="0">
+                <a:latin typeface="Arial" panose="020B0604020202020204" pitchFamily="34" charset="0"/>
+                <a:cs typeface="Arial" panose="020B0604020202020204" pitchFamily="34" charset="0"/>
+              </a:rPr>
+              <a:t>назъбен масив</a:t>
+            </a:r>
+            <a:r>
+              <a:rPr lang="en-US" dirty="0">
+                <a:latin typeface="Arial" panose="020B0604020202020204" pitchFamily="34" charset="0"/>
+                <a:cs typeface="Arial" panose="020B0604020202020204" pitchFamily="34" charset="0"/>
+              </a:rPr>
+              <a:t>)</a:t>
+            </a:r>
+            <a:endParaRPr lang="bg-BG" dirty="0">
+              <a:latin typeface="Arial" panose="020B0604020202020204" pitchFamily="34" charset="0"/>
+              <a:cs typeface="Arial" panose="020B0604020202020204" pitchFamily="34" charset="0"/>
+            </a:endParaRPr>
+          </a:p>
+        </p:txBody>
+      </p:sp>
+      <p:sp>
+        <p:nvSpPr>
+          <p:cNvPr id="3" name="Content Placeholder 2">
+            <a:extLst>
+              <a:ext uri="{FF2B5EF4-FFF2-40B4-BE49-F238E27FC236}">
+                <a16:creationId xmlns:a16="http://schemas.microsoft.com/office/drawing/2014/main" id="{2709B828-20F4-FD73-D1B5-000ABCE6E2E0}"/>
+              </a:ext>
+            </a:extLst>
+          </p:cNvPr>
+          <p:cNvSpPr>
+            <a:spLocks noGrp="1"/>
+          </p:cNvSpPr>
+          <p:nvPr>
+            <p:ph idx="1"/>
+          </p:nvPr>
+        </p:nvSpPr>
+        <p:spPr/>
+        <p:txBody>
+          <a:bodyPr/>
+          <a:lstStyle/>
+          <a:p>
+            <a:pPr marL="0" indent="0">
+              <a:buNone/>
+            </a:pPr>
+            <a:r>
+              <a:rPr lang="en-US" sz="1800" dirty="0">
+                <a:solidFill>
+                  <a:srgbClr val="0070C0"/>
+                </a:solidFill>
+                <a:latin typeface="Cascadia Mono" panose="020B0609020000020004" pitchFamily="49" charset="0"/>
+              </a:rPr>
+              <a:t>int</a:t>
+            </a:r>
+            <a:r>
+              <a:rPr lang="en-US" sz="1800" dirty="0">
+                <a:solidFill>
+                  <a:srgbClr val="000000"/>
+                </a:solidFill>
+                <a:latin typeface="Cascadia Mono" panose="020B0609020000020004" pitchFamily="49" charset="0"/>
+              </a:rPr>
+              <a:t>[][] </a:t>
+            </a:r>
+            <a:r>
+              <a:rPr lang="en-US" sz="1800" dirty="0" err="1">
+                <a:solidFill>
+                  <a:srgbClr val="000000"/>
+                </a:solidFill>
+                <a:latin typeface="Cascadia Mono" panose="020B0609020000020004" pitchFamily="49" charset="0"/>
+              </a:rPr>
+              <a:t>jaggedArray</a:t>
+            </a:r>
+            <a:r>
+              <a:rPr lang="en-US" sz="1800" dirty="0">
+                <a:solidFill>
+                  <a:srgbClr val="000000"/>
+                </a:solidFill>
+                <a:latin typeface="Cascadia Mono" panose="020B0609020000020004" pitchFamily="49" charset="0"/>
+              </a:rPr>
+              <a:t> = </a:t>
+            </a:r>
+            <a:r>
+              <a:rPr lang="en-US" sz="1800" dirty="0">
+                <a:solidFill>
+                  <a:srgbClr val="00B050"/>
+                </a:solidFill>
+                <a:latin typeface="Cascadia Mono" panose="020B0609020000020004" pitchFamily="49" charset="0"/>
+              </a:rPr>
+              <a:t>new</a:t>
+            </a:r>
+            <a:r>
+              <a:rPr lang="en-US" sz="1800" dirty="0">
+                <a:solidFill>
+                  <a:srgbClr val="000000"/>
+                </a:solidFill>
+                <a:latin typeface="Cascadia Mono" panose="020B0609020000020004" pitchFamily="49" charset="0"/>
+              </a:rPr>
+              <a:t> </a:t>
+            </a:r>
+            <a:r>
+              <a:rPr lang="en-US" sz="1800" dirty="0">
+                <a:solidFill>
+                  <a:srgbClr val="0070C0"/>
+                </a:solidFill>
+                <a:latin typeface="Cascadia Mono" panose="020B0609020000020004" pitchFamily="49" charset="0"/>
+              </a:rPr>
+              <a:t>int</a:t>
+            </a:r>
+            <a:r>
+              <a:rPr lang="en-US" sz="1800" dirty="0">
+                <a:solidFill>
+                  <a:srgbClr val="000000"/>
+                </a:solidFill>
+                <a:latin typeface="Cascadia Mono" panose="020B0609020000020004" pitchFamily="49" charset="0"/>
+              </a:rPr>
+              <a:t>[4][];</a:t>
+            </a:r>
+          </a:p>
+          <a:p>
+            <a:pPr marL="0" indent="0">
+              <a:buNone/>
+            </a:pPr>
+            <a:r>
+              <a:rPr lang="bg-BG" sz="1800" dirty="0">
+                <a:solidFill>
+                  <a:srgbClr val="000000"/>
+                </a:solidFill>
+                <a:latin typeface="Cascadia Mono" panose="020B0609020000020004" pitchFamily="49" charset="0"/>
+              </a:rPr>
+              <a:t>           </a:t>
+            </a:r>
+          </a:p>
+          <a:p>
+            <a:pPr marL="0" indent="0">
+              <a:buNone/>
+            </a:pPr>
+            <a:r>
+              <a:rPr lang="en-US" sz="1800" dirty="0" err="1">
+                <a:solidFill>
+                  <a:srgbClr val="000000"/>
+                </a:solidFill>
+                <a:latin typeface="Cascadia Mono" panose="020B0609020000020004" pitchFamily="49" charset="0"/>
+              </a:rPr>
+              <a:t>jaggedArray</a:t>
+            </a:r>
+            <a:r>
+              <a:rPr lang="en-US" sz="1800" dirty="0">
+                <a:solidFill>
+                  <a:srgbClr val="000000"/>
+                </a:solidFill>
+                <a:latin typeface="Cascadia Mono" panose="020B0609020000020004" pitchFamily="49" charset="0"/>
+              </a:rPr>
+              <a:t>[0] = </a:t>
+            </a:r>
+            <a:r>
+              <a:rPr lang="en-US" sz="1800" dirty="0">
+                <a:solidFill>
+                  <a:srgbClr val="00B050"/>
+                </a:solidFill>
+                <a:latin typeface="Cascadia Mono" panose="020B0609020000020004" pitchFamily="49" charset="0"/>
+              </a:rPr>
+              <a:t>new</a:t>
+            </a:r>
+            <a:r>
+              <a:rPr lang="en-US" sz="1800" dirty="0">
+                <a:solidFill>
+                  <a:srgbClr val="000000"/>
+                </a:solidFill>
+                <a:latin typeface="Cascadia Mono" panose="020B0609020000020004" pitchFamily="49" charset="0"/>
+              </a:rPr>
+              <a:t> </a:t>
+            </a:r>
+            <a:r>
+              <a:rPr lang="en-US" sz="1800" dirty="0">
+                <a:solidFill>
+                  <a:srgbClr val="0070C0"/>
+                </a:solidFill>
+                <a:latin typeface="Cascadia Mono" panose="020B0609020000020004" pitchFamily="49" charset="0"/>
+              </a:rPr>
+              <a:t>int</a:t>
+            </a:r>
+            <a:r>
+              <a:rPr lang="en-US" sz="1800" dirty="0">
+                <a:solidFill>
+                  <a:srgbClr val="000000"/>
+                </a:solidFill>
+                <a:latin typeface="Cascadia Mono" panose="020B0609020000020004" pitchFamily="49" charset="0"/>
+              </a:rPr>
+              <a:t>[] { 1, 2, 3, 4 };           </a:t>
+            </a:r>
+          </a:p>
+          <a:p>
+            <a:pPr marL="0" indent="0">
+              <a:buNone/>
+            </a:pPr>
+            <a:r>
+              <a:rPr lang="en-US" sz="1800" dirty="0" err="1">
+                <a:solidFill>
+                  <a:srgbClr val="000000"/>
+                </a:solidFill>
+                <a:latin typeface="Cascadia Mono" panose="020B0609020000020004" pitchFamily="49" charset="0"/>
+              </a:rPr>
+              <a:t>jaggedArray</a:t>
+            </a:r>
+            <a:r>
+              <a:rPr lang="en-US" sz="1800" dirty="0">
+                <a:solidFill>
+                  <a:srgbClr val="000000"/>
+                </a:solidFill>
+                <a:latin typeface="Cascadia Mono" panose="020B0609020000020004" pitchFamily="49" charset="0"/>
+              </a:rPr>
+              <a:t>[1] = </a:t>
+            </a:r>
+            <a:r>
+              <a:rPr lang="en-US" sz="1800" dirty="0">
+                <a:solidFill>
+                  <a:srgbClr val="00B050"/>
+                </a:solidFill>
+                <a:latin typeface="Cascadia Mono" panose="020B0609020000020004" pitchFamily="49" charset="0"/>
+              </a:rPr>
+              <a:t>new</a:t>
+            </a:r>
+            <a:r>
+              <a:rPr lang="en-US" sz="1800" dirty="0">
+                <a:solidFill>
+                  <a:srgbClr val="000000"/>
+                </a:solidFill>
+                <a:latin typeface="Cascadia Mono" panose="020B0609020000020004" pitchFamily="49" charset="0"/>
+              </a:rPr>
+              <a:t> </a:t>
+            </a:r>
+            <a:r>
+              <a:rPr lang="en-US" sz="1800" dirty="0">
+                <a:solidFill>
+                  <a:srgbClr val="0070C0"/>
+                </a:solidFill>
+                <a:latin typeface="Cascadia Mono" panose="020B0609020000020004" pitchFamily="49" charset="0"/>
+              </a:rPr>
+              <a:t>int</a:t>
+            </a:r>
+            <a:r>
+              <a:rPr lang="en-US" sz="1800" dirty="0">
+                <a:solidFill>
+                  <a:srgbClr val="000000"/>
+                </a:solidFill>
+                <a:latin typeface="Cascadia Mono" panose="020B0609020000020004" pitchFamily="49" charset="0"/>
+              </a:rPr>
+              <a:t>[] { 5, 6 };</a:t>
+            </a:r>
+          </a:p>
+          <a:p>
+            <a:pPr marL="0" indent="0">
+              <a:buNone/>
+            </a:pPr>
+            <a:r>
+              <a:rPr lang="en-US" sz="1800" dirty="0" err="1">
+                <a:solidFill>
+                  <a:srgbClr val="000000"/>
+                </a:solidFill>
+                <a:latin typeface="Cascadia Mono" panose="020B0609020000020004" pitchFamily="49" charset="0"/>
+              </a:rPr>
+              <a:t>jaggedArray</a:t>
+            </a:r>
+            <a:r>
+              <a:rPr lang="en-US" sz="1800" dirty="0">
+                <a:solidFill>
+                  <a:srgbClr val="000000"/>
+                </a:solidFill>
+                <a:latin typeface="Cascadia Mono" panose="020B0609020000020004" pitchFamily="49" charset="0"/>
+              </a:rPr>
+              <a:t>[2] = </a:t>
+            </a:r>
+            <a:r>
+              <a:rPr lang="en-US" sz="1800" dirty="0">
+                <a:solidFill>
+                  <a:srgbClr val="00B050"/>
+                </a:solidFill>
+                <a:latin typeface="Cascadia Mono" panose="020B0609020000020004" pitchFamily="49" charset="0"/>
+              </a:rPr>
+              <a:t>new</a:t>
+            </a:r>
+            <a:r>
+              <a:rPr lang="en-US" sz="1800" dirty="0">
+                <a:solidFill>
+                  <a:srgbClr val="000000"/>
+                </a:solidFill>
+                <a:latin typeface="Cascadia Mono" panose="020B0609020000020004" pitchFamily="49" charset="0"/>
+              </a:rPr>
+              <a:t> </a:t>
+            </a:r>
+            <a:r>
+              <a:rPr lang="en-US" sz="1800" dirty="0">
+                <a:solidFill>
+                  <a:srgbClr val="0070C0"/>
+                </a:solidFill>
+                <a:latin typeface="Cascadia Mono" panose="020B0609020000020004" pitchFamily="49" charset="0"/>
+              </a:rPr>
+              <a:t>int</a:t>
+            </a:r>
+            <a:r>
+              <a:rPr lang="en-US" sz="1800" dirty="0">
+                <a:solidFill>
+                  <a:srgbClr val="000000"/>
+                </a:solidFill>
+                <a:latin typeface="Cascadia Mono" panose="020B0609020000020004" pitchFamily="49" charset="0"/>
+              </a:rPr>
+              <a:t>[] { 7, 8, 9 };         </a:t>
+            </a:r>
+          </a:p>
+          <a:p>
+            <a:pPr marL="0" indent="0">
+              <a:buNone/>
+            </a:pPr>
+            <a:r>
+              <a:rPr lang="en-US" sz="1800" dirty="0" err="1">
+                <a:solidFill>
+                  <a:srgbClr val="000000"/>
+                </a:solidFill>
+                <a:latin typeface="Cascadia Mono" panose="020B0609020000020004" pitchFamily="49" charset="0"/>
+              </a:rPr>
+              <a:t>jaggedArray</a:t>
+            </a:r>
+            <a:r>
+              <a:rPr lang="en-US" sz="1800" dirty="0">
+                <a:solidFill>
+                  <a:srgbClr val="000000"/>
+                </a:solidFill>
+                <a:latin typeface="Cascadia Mono" panose="020B0609020000020004" pitchFamily="49" charset="0"/>
+              </a:rPr>
+              <a:t>[3] = </a:t>
+            </a:r>
+            <a:r>
+              <a:rPr lang="en-US" sz="1800" dirty="0">
+                <a:solidFill>
+                  <a:srgbClr val="00B050"/>
+                </a:solidFill>
+                <a:latin typeface="Cascadia Mono" panose="020B0609020000020004" pitchFamily="49" charset="0"/>
+              </a:rPr>
+              <a:t>new</a:t>
+            </a:r>
+            <a:r>
+              <a:rPr lang="en-US" sz="1800" dirty="0">
+                <a:solidFill>
+                  <a:srgbClr val="000000"/>
+                </a:solidFill>
+                <a:latin typeface="Cascadia Mono" panose="020B0609020000020004" pitchFamily="49" charset="0"/>
+              </a:rPr>
+              <a:t> </a:t>
+            </a:r>
+            <a:r>
+              <a:rPr lang="en-US" sz="1800" dirty="0">
+                <a:solidFill>
+                  <a:srgbClr val="0070C0"/>
+                </a:solidFill>
+                <a:latin typeface="Cascadia Mono" panose="020B0609020000020004" pitchFamily="49" charset="0"/>
+              </a:rPr>
+              <a:t>int</a:t>
+            </a:r>
+            <a:r>
+              <a:rPr lang="en-US" sz="1800" dirty="0">
+                <a:solidFill>
+                  <a:srgbClr val="000000"/>
+                </a:solidFill>
+                <a:latin typeface="Cascadia Mono" panose="020B0609020000020004" pitchFamily="49" charset="0"/>
+              </a:rPr>
+              <a:t>[] { 10, 11, 12, 13, 14 };</a:t>
+            </a:r>
+            <a:endParaRPr lang="bg-BG" dirty="0"/>
+          </a:p>
+        </p:txBody>
+      </p:sp>
+    </p:spTree>
+    <p:extLst>
+      <p:ext uri="{BB962C8B-B14F-4D97-AF65-F5344CB8AC3E}">
+        <p14:creationId xmlns:p14="http://schemas.microsoft.com/office/powerpoint/2010/main" val="83574577"/>
+      </p:ext>
+    </p:extLst>
+  </p:cSld>
+  <p:clrMapOvr>
+    <a:masterClrMapping/>
+  </p:clrMapOvr>
+</p:sld>
+</file>
+
+<file path=ppt/slides/slide23.xml><?xml version="1.0" encoding="utf-8"?>
+<p:sld xmlns:a="http://schemas.openxmlformats.org/drawingml/2006/main" xmlns:r="http://schemas.openxmlformats.org/officeDocument/2006/relationships" xmlns:p="http://schemas.openxmlformats.org/presentationml/2006/main">
+  <p:cSld>
+    <p:spTree>
+      <p:nvGrpSpPr>
+        <p:cNvPr id="1" name=""/>
+        <p:cNvGrpSpPr/>
+        <p:nvPr/>
+      </p:nvGrpSpPr>
+      <p:grpSpPr>
+        <a:xfrm>
+          <a:off x="0" y="0"/>
+          <a:ext cx="0" cy="0"/>
+          <a:chOff x="0" y="0"/>
+          <a:chExt cx="0" cy="0"/>
+        </a:xfrm>
+      </p:grpSpPr>
+      <p:sp>
+        <p:nvSpPr>
+          <p:cNvPr id="2" name="Title 1">
+            <a:extLst>
+              <a:ext uri="{FF2B5EF4-FFF2-40B4-BE49-F238E27FC236}">
+                <a16:creationId xmlns:a16="http://schemas.microsoft.com/office/drawing/2014/main" id="{01F81551-A5C7-C31E-3021-68EC694146C6}"/>
+              </a:ext>
+            </a:extLst>
+          </p:cNvPr>
+          <p:cNvSpPr>
+            <a:spLocks noGrp="1"/>
+          </p:cNvSpPr>
+          <p:nvPr>
+            <p:ph type="title"/>
+          </p:nvPr>
+        </p:nvSpPr>
+        <p:spPr>
+          <a:xfrm>
+            <a:off x="1089050" y="957193"/>
+            <a:ext cx="8761413" cy="706964"/>
+          </a:xfrm>
+        </p:spPr>
+        <p:txBody>
+          <a:bodyPr/>
+          <a:lstStyle/>
+          <a:p>
+            <a:pPr algn="ctr"/>
+            <a:r>
+              <a:rPr lang="bg-BG" dirty="0">
+                <a:latin typeface="Arial" panose="020B0604020202020204" pitchFamily="34" charset="0"/>
+                <a:cs typeface="Arial" panose="020B0604020202020204" pitchFamily="34" charset="0"/>
+              </a:rPr>
+              <a:t>Достъпване на елементите на </a:t>
+            </a:r>
+            <a:r>
+              <a:rPr lang="en-US" dirty="0">
+                <a:latin typeface="Arial" panose="020B0604020202020204" pitchFamily="34" charset="0"/>
+                <a:cs typeface="Arial" panose="020B0604020202020204" pitchFamily="34" charset="0"/>
+              </a:rPr>
+              <a:t>jagged array (</a:t>
+            </a:r>
+            <a:r>
+              <a:rPr lang="bg-BG" dirty="0">
+                <a:latin typeface="Arial" panose="020B0604020202020204" pitchFamily="34" charset="0"/>
+                <a:cs typeface="Arial" panose="020B0604020202020204" pitchFamily="34" charset="0"/>
+              </a:rPr>
+              <a:t>назъбен масив</a:t>
+            </a:r>
+            <a:r>
+              <a:rPr lang="en-US" dirty="0">
+                <a:latin typeface="Arial" panose="020B0604020202020204" pitchFamily="34" charset="0"/>
+                <a:cs typeface="Arial" panose="020B0604020202020204" pitchFamily="34" charset="0"/>
+              </a:rPr>
+              <a:t>)</a:t>
+            </a:r>
+            <a:endParaRPr lang="bg-BG" dirty="0">
+              <a:latin typeface="Arial" panose="020B0604020202020204" pitchFamily="34" charset="0"/>
+              <a:cs typeface="Arial" panose="020B0604020202020204" pitchFamily="34" charset="0"/>
+            </a:endParaRPr>
+          </a:p>
+        </p:txBody>
+      </p:sp>
+      <p:sp>
+        <p:nvSpPr>
+          <p:cNvPr id="3" name="Content Placeholder 2">
+            <a:extLst>
+              <a:ext uri="{FF2B5EF4-FFF2-40B4-BE49-F238E27FC236}">
+                <a16:creationId xmlns:a16="http://schemas.microsoft.com/office/drawing/2014/main" id="{7F117536-7514-339C-E721-833B1C879E29}"/>
+              </a:ext>
+            </a:extLst>
+          </p:cNvPr>
+          <p:cNvSpPr>
+            <a:spLocks noGrp="1"/>
+          </p:cNvSpPr>
+          <p:nvPr>
+            <p:ph idx="1"/>
+          </p:nvPr>
+        </p:nvSpPr>
+        <p:spPr/>
+        <p:txBody>
+          <a:bodyPr/>
+          <a:lstStyle/>
+          <a:p>
+            <a:pPr marL="0" indent="0">
+              <a:buNone/>
+            </a:pPr>
+            <a:r>
+              <a:rPr lang="en-US" sz="1800" dirty="0">
+                <a:solidFill>
+                  <a:srgbClr val="000000"/>
+                </a:solidFill>
+                <a:latin typeface="Cascadia Mono" panose="020B0609020000020004" pitchFamily="49" charset="0"/>
+              </a:rPr>
+              <a:t> </a:t>
+            </a:r>
+            <a:r>
+              <a:rPr lang="en-US" dirty="0" err="1">
+                <a:solidFill>
+                  <a:srgbClr val="000000"/>
+                </a:solidFill>
+                <a:latin typeface="Cascadia Mono" panose="020B0609020000020004" pitchFamily="49" charset="0"/>
+              </a:rPr>
+              <a:t>j</a:t>
+            </a:r>
+            <a:r>
+              <a:rPr lang="en-US" sz="1800" dirty="0" err="1">
+                <a:solidFill>
+                  <a:srgbClr val="000000"/>
+                </a:solidFill>
+                <a:latin typeface="Cascadia Mono" panose="020B0609020000020004" pitchFamily="49" charset="0"/>
+              </a:rPr>
+              <a:t>aggedArray</a:t>
+            </a:r>
+            <a:r>
+              <a:rPr lang="en-US" sz="1800" dirty="0">
+                <a:solidFill>
+                  <a:srgbClr val="000000"/>
+                </a:solidFill>
+                <a:latin typeface="Cascadia Mono" panose="020B0609020000020004" pitchFamily="49" charset="0"/>
+              </a:rPr>
+              <a:t>[0][0] = 100;</a:t>
+            </a:r>
+          </a:p>
+          <a:p>
+            <a:pPr marL="0" indent="0">
+              <a:buNone/>
+            </a:pPr>
+            <a:r>
+              <a:rPr lang="en-US" sz="1800" dirty="0">
+                <a:solidFill>
+                  <a:srgbClr val="000000"/>
+                </a:solidFill>
+                <a:latin typeface="Cascadia Mono" panose="020B0609020000020004" pitchFamily="49" charset="0"/>
+              </a:rPr>
+              <a:t> </a:t>
+            </a:r>
+            <a:r>
+              <a:rPr lang="en-US" dirty="0" err="1">
+                <a:solidFill>
+                  <a:srgbClr val="000000"/>
+                </a:solidFill>
+                <a:latin typeface="Cascadia Mono" panose="020B0609020000020004" pitchFamily="49" charset="0"/>
+              </a:rPr>
+              <a:t>j</a:t>
+            </a:r>
+            <a:r>
+              <a:rPr lang="en-US" sz="1800" dirty="0" err="1">
+                <a:solidFill>
+                  <a:srgbClr val="000000"/>
+                </a:solidFill>
+                <a:latin typeface="Cascadia Mono" panose="020B0609020000020004" pitchFamily="49" charset="0"/>
+              </a:rPr>
+              <a:t>aggedArray</a:t>
+            </a:r>
+            <a:r>
+              <a:rPr lang="en-US" sz="1800" dirty="0">
+                <a:solidFill>
+                  <a:srgbClr val="000000"/>
+                </a:solidFill>
+                <a:latin typeface="Cascadia Mono" panose="020B0609020000020004" pitchFamily="49" charset="0"/>
+              </a:rPr>
+              <a:t>[2][3] = 55;</a:t>
+            </a:r>
+            <a:endParaRPr lang="bg-BG" sz="1800" dirty="0">
+              <a:solidFill>
+                <a:srgbClr val="000000"/>
+              </a:solidFill>
+              <a:latin typeface="Cascadia Mono" panose="020B0609020000020004" pitchFamily="49" charset="0"/>
+            </a:endParaRPr>
+          </a:p>
+          <a:p>
+            <a:pPr marL="0" indent="0">
+              <a:buNone/>
+            </a:pPr>
+            <a:endParaRPr lang="bg-BG" dirty="0">
+              <a:solidFill>
+                <a:srgbClr val="000000"/>
+              </a:solidFill>
+              <a:latin typeface="Cascadia Mono" panose="020B0609020000020004" pitchFamily="49" charset="0"/>
+            </a:endParaRPr>
+          </a:p>
+          <a:p>
+            <a:pPr marL="0" indent="0">
+              <a:buNone/>
+            </a:pPr>
+            <a:r>
+              <a:rPr lang="bg-BG" b="1" i="1" u="sng" dirty="0">
+                <a:solidFill>
+                  <a:srgbClr val="FF0000"/>
+                </a:solidFill>
+                <a:latin typeface="Arial" panose="020B0604020202020204" pitchFamily="34" charset="0"/>
+                <a:cs typeface="Arial" panose="020B0604020202020204" pitchFamily="34" charset="0"/>
+              </a:rPr>
+              <a:t>Внимание: </a:t>
+            </a:r>
+            <a:r>
+              <a:rPr lang="bg-BG" dirty="0">
+                <a:solidFill>
+                  <a:srgbClr val="000000"/>
+                </a:solidFill>
+                <a:latin typeface="Arial" panose="020B0604020202020204" pitchFamily="34" charset="0"/>
+                <a:cs typeface="Arial" panose="020B0604020202020204" pitchFamily="34" charset="0"/>
+              </a:rPr>
+              <a:t>Трябва да бъдете внимателни, когато искате да достъпите елемент на конкретен индекс в назъбения масив, тъй като различните масиви</a:t>
+            </a:r>
+            <a:r>
+              <a:rPr lang="en-US" dirty="0">
+                <a:solidFill>
+                  <a:srgbClr val="000000"/>
+                </a:solidFill>
+                <a:latin typeface="Arial" panose="020B0604020202020204" pitchFamily="34" charset="0"/>
+                <a:cs typeface="Arial" panose="020B0604020202020204" pitchFamily="34" charset="0"/>
+              </a:rPr>
+              <a:t> </a:t>
+            </a:r>
+            <a:r>
+              <a:rPr lang="bg-BG" dirty="0">
+                <a:solidFill>
+                  <a:srgbClr val="000000"/>
+                </a:solidFill>
+                <a:latin typeface="Arial" panose="020B0604020202020204" pitchFamily="34" charset="0"/>
+                <a:cs typeface="Arial" panose="020B0604020202020204" pitchFamily="34" charset="0"/>
+              </a:rPr>
+              <a:t>в общия масив имат различна размерност.</a:t>
+            </a:r>
+          </a:p>
+          <a:p>
+            <a:pPr marL="0" indent="0">
+              <a:buNone/>
+            </a:pPr>
+            <a:r>
+              <a:rPr lang="bg-BG" dirty="0">
+                <a:solidFill>
+                  <a:srgbClr val="000000"/>
+                </a:solidFill>
+                <a:latin typeface="Arial" panose="020B0604020202020204" pitchFamily="34" charset="0"/>
+                <a:cs typeface="Arial" panose="020B0604020202020204" pitchFamily="34" charset="0"/>
+              </a:rPr>
+              <a:t>Ако се опитате да достъпите елемент на несъществуващ индекс, то ще получите </a:t>
+            </a:r>
+            <a:r>
+              <a:rPr lang="en-US" b="1" dirty="0">
+                <a:solidFill>
+                  <a:srgbClr val="000000"/>
+                </a:solidFill>
+                <a:latin typeface="Arial" panose="020B0604020202020204" pitchFamily="34" charset="0"/>
+                <a:cs typeface="Arial" panose="020B0604020202020204" pitchFamily="34" charset="0"/>
+              </a:rPr>
+              <a:t>Exception</a:t>
+            </a:r>
+            <a:r>
+              <a:rPr lang="en-US" dirty="0">
+                <a:solidFill>
+                  <a:srgbClr val="000000"/>
+                </a:solidFill>
+                <a:latin typeface="Arial" panose="020B0604020202020204" pitchFamily="34" charset="0"/>
+                <a:cs typeface="Arial" panose="020B0604020202020204" pitchFamily="34" charset="0"/>
+              </a:rPr>
+              <a:t>.</a:t>
+            </a:r>
+            <a:endParaRPr lang="bg-BG" dirty="0">
+              <a:latin typeface="Arial" panose="020B0604020202020204" pitchFamily="34" charset="0"/>
+              <a:cs typeface="Arial" panose="020B0604020202020204" pitchFamily="34" charset="0"/>
+            </a:endParaRPr>
+          </a:p>
+        </p:txBody>
+      </p:sp>
+    </p:spTree>
+    <p:extLst>
+      <p:ext uri="{BB962C8B-B14F-4D97-AF65-F5344CB8AC3E}">
+        <p14:creationId xmlns:p14="http://schemas.microsoft.com/office/powerpoint/2010/main" val="767949395"/>
+      </p:ext>
+    </p:extLst>
+  </p:cSld>
+  <p:clrMapOvr>
+    <a:masterClrMapping/>
+  </p:clrMapOvr>
+</p:sld>
+</file>
+
+<file path=ppt/slides/slide24.xml><?xml version="1.0" encoding="utf-8"?>
+<p:sld xmlns:a="http://schemas.openxmlformats.org/drawingml/2006/main" xmlns:r="http://schemas.openxmlformats.org/officeDocument/2006/relationships" xmlns:p="http://schemas.openxmlformats.org/presentationml/2006/main">
+  <p:cSld>
+    <p:spTree>
+      <p:nvGrpSpPr>
+        <p:cNvPr id="1" name=""/>
+        <p:cNvGrpSpPr/>
+        <p:nvPr/>
+      </p:nvGrpSpPr>
+      <p:grpSpPr>
+        <a:xfrm>
+          <a:off x="0" y="0"/>
+          <a:ext cx="0" cy="0"/>
+          <a:chOff x="0" y="0"/>
+          <a:chExt cx="0" cy="0"/>
+        </a:xfrm>
+      </p:grpSpPr>
+      <p:sp>
+        <p:nvSpPr>
+          <p:cNvPr id="2" name="Title 1">
+            <a:extLst>
+              <a:ext uri="{FF2B5EF4-FFF2-40B4-BE49-F238E27FC236}">
+                <a16:creationId xmlns:a16="http://schemas.microsoft.com/office/drawing/2014/main" id="{D038EEBE-8B5F-1D64-768B-527168C70C4A}"/>
+              </a:ext>
+            </a:extLst>
+          </p:cNvPr>
+          <p:cNvSpPr>
+            <a:spLocks noGrp="1"/>
+          </p:cNvSpPr>
+          <p:nvPr>
+            <p:ph type="title"/>
+          </p:nvPr>
+        </p:nvSpPr>
+        <p:spPr>
+          <a:xfrm>
+            <a:off x="1154953" y="973668"/>
+            <a:ext cx="8761413" cy="945748"/>
+          </a:xfrm>
+        </p:spPr>
+        <p:txBody>
+          <a:bodyPr/>
+          <a:lstStyle/>
+          <a:p>
+            <a:pPr algn="ctr"/>
+            <a:r>
+              <a:rPr lang="bg-BG" dirty="0">
+                <a:latin typeface="Arial" panose="020B0604020202020204" pitchFamily="34" charset="0"/>
+                <a:cs typeface="Arial" panose="020B0604020202020204" pitchFamily="34" charset="0"/>
+              </a:rPr>
+              <a:t>Принтиране на елементите на назъбен масив</a:t>
+            </a:r>
+          </a:p>
+        </p:txBody>
+      </p:sp>
+      <p:sp>
+        <p:nvSpPr>
+          <p:cNvPr id="3" name="Content Placeholder 2">
+            <a:extLst>
+              <a:ext uri="{FF2B5EF4-FFF2-40B4-BE49-F238E27FC236}">
+                <a16:creationId xmlns:a16="http://schemas.microsoft.com/office/drawing/2014/main" id="{77E3F4AA-BDAC-ACFF-9679-0712CC7A3F32}"/>
+              </a:ext>
+            </a:extLst>
+          </p:cNvPr>
+          <p:cNvSpPr>
+            <a:spLocks noGrp="1"/>
+          </p:cNvSpPr>
+          <p:nvPr>
+            <p:ph idx="1"/>
+          </p:nvPr>
+        </p:nvSpPr>
+        <p:spPr/>
+        <p:txBody>
+          <a:bodyPr>
+            <a:normAutofit lnSpcReduction="10000"/>
+          </a:bodyPr>
+          <a:lstStyle/>
+          <a:p>
+            <a:pPr marL="0" indent="0">
+              <a:buNone/>
+            </a:pPr>
+            <a:r>
+              <a:rPr lang="en-US" sz="1800" dirty="0">
+                <a:solidFill>
+                  <a:srgbClr val="000000"/>
+                </a:solidFill>
+                <a:latin typeface="Cascadia Mono" panose="020B0609020000020004" pitchFamily="49" charset="0"/>
+              </a:rPr>
+              <a:t> </a:t>
+            </a:r>
+            <a:r>
+              <a:rPr lang="en-US" sz="1800" dirty="0">
+                <a:solidFill>
+                  <a:srgbClr val="7030A0"/>
+                </a:solidFill>
+                <a:latin typeface="Cascadia Mono" panose="020B0609020000020004" pitchFamily="49" charset="0"/>
+              </a:rPr>
+              <a:t>for</a:t>
+            </a:r>
+            <a:r>
+              <a:rPr lang="en-US" sz="1800" dirty="0">
+                <a:solidFill>
+                  <a:srgbClr val="000000"/>
+                </a:solidFill>
+                <a:latin typeface="Cascadia Mono" panose="020B0609020000020004" pitchFamily="49" charset="0"/>
+              </a:rPr>
+              <a:t> (int row = 0; row &lt; </a:t>
+            </a:r>
+            <a:r>
+              <a:rPr lang="en-US" sz="1800" dirty="0" err="1">
+                <a:solidFill>
+                  <a:srgbClr val="000000"/>
+                </a:solidFill>
+                <a:latin typeface="Cascadia Mono" panose="020B0609020000020004" pitchFamily="49" charset="0"/>
+              </a:rPr>
+              <a:t>jaggedArray.</a:t>
+            </a:r>
+            <a:r>
+              <a:rPr lang="en-US" sz="1800" dirty="0" err="1">
+                <a:solidFill>
+                  <a:schemeClr val="tx2">
+                    <a:lumMod val="60000"/>
+                    <a:lumOff val="40000"/>
+                  </a:schemeClr>
+                </a:solidFill>
+                <a:latin typeface="Cascadia Mono" panose="020B0609020000020004" pitchFamily="49" charset="0"/>
+              </a:rPr>
+              <a:t>Length</a:t>
+            </a:r>
+            <a:r>
+              <a:rPr lang="en-US" sz="1800" dirty="0">
+                <a:solidFill>
+                  <a:srgbClr val="000000"/>
+                </a:solidFill>
+                <a:latin typeface="Cascadia Mono" panose="020B0609020000020004" pitchFamily="49" charset="0"/>
+              </a:rPr>
+              <a:t>; row++)</a:t>
+            </a:r>
+          </a:p>
+          <a:p>
+            <a:pPr marL="0" indent="0">
+              <a:buNone/>
+            </a:pPr>
+            <a:r>
+              <a:rPr lang="bg-BG" sz="1800" dirty="0">
+                <a:solidFill>
+                  <a:srgbClr val="000000"/>
+                </a:solidFill>
+                <a:latin typeface="Cascadia Mono" panose="020B0609020000020004" pitchFamily="49" charset="0"/>
+              </a:rPr>
+              <a:t> {</a:t>
+            </a:r>
+          </a:p>
+          <a:p>
+            <a:pPr marL="0" indent="0">
+              <a:buNone/>
+            </a:pPr>
+            <a:r>
+              <a:rPr lang="en-US" sz="1800" dirty="0">
+                <a:solidFill>
+                  <a:srgbClr val="000000"/>
+                </a:solidFill>
+                <a:latin typeface="Cascadia Mono" panose="020B0609020000020004" pitchFamily="49" charset="0"/>
+              </a:rPr>
+              <a:t>     </a:t>
+            </a:r>
+            <a:r>
+              <a:rPr lang="en-US" sz="1800" dirty="0">
+                <a:solidFill>
+                  <a:srgbClr val="7030A0"/>
+                </a:solidFill>
+                <a:latin typeface="Cascadia Mono" panose="020B0609020000020004" pitchFamily="49" charset="0"/>
+              </a:rPr>
+              <a:t>for</a:t>
+            </a:r>
+            <a:r>
+              <a:rPr lang="en-US" sz="1800" dirty="0">
+                <a:solidFill>
+                  <a:srgbClr val="000000"/>
+                </a:solidFill>
+                <a:latin typeface="Cascadia Mono" panose="020B0609020000020004" pitchFamily="49" charset="0"/>
+              </a:rPr>
+              <a:t> (int col = 0; col &lt; </a:t>
+            </a:r>
+            <a:r>
+              <a:rPr lang="en-US" sz="1800" dirty="0" err="1">
+                <a:solidFill>
+                  <a:srgbClr val="000000"/>
+                </a:solidFill>
+                <a:latin typeface="Cascadia Mono" panose="020B0609020000020004" pitchFamily="49" charset="0"/>
+              </a:rPr>
+              <a:t>jaggedArray</a:t>
+            </a:r>
+            <a:r>
+              <a:rPr lang="en-US" sz="1800">
+                <a:solidFill>
+                  <a:srgbClr val="000000"/>
+                </a:solidFill>
+                <a:latin typeface="Cascadia Mono" panose="020B0609020000020004" pitchFamily="49" charset="0"/>
+              </a:rPr>
+              <a:t>[</a:t>
+            </a:r>
+            <a:r>
+              <a:rPr lang="en-US">
+                <a:solidFill>
+                  <a:srgbClr val="000000"/>
+                </a:solidFill>
+                <a:latin typeface="Cascadia Mono" panose="020B0609020000020004" pitchFamily="49" charset="0"/>
+              </a:rPr>
+              <a:t>ro</a:t>
+            </a:r>
+            <a:r>
+              <a:rPr lang="en-US" dirty="0">
+                <a:solidFill>
+                  <a:srgbClr val="000000"/>
+                </a:solidFill>
+                <a:latin typeface="Cascadia Mono" panose="020B0609020000020004" pitchFamily="49" charset="0"/>
+              </a:rPr>
+              <a:t>w</a:t>
+            </a:r>
+            <a:r>
+              <a:rPr lang="en-US" sz="1800">
+                <a:solidFill>
+                  <a:srgbClr val="000000"/>
+                </a:solidFill>
+                <a:latin typeface="Cascadia Mono" panose="020B0609020000020004" pitchFamily="49" charset="0"/>
+              </a:rPr>
+              <a:t>].</a:t>
+            </a:r>
+            <a:r>
+              <a:rPr lang="en-US" sz="1800" dirty="0">
+                <a:solidFill>
+                  <a:srgbClr val="00B0F0"/>
+                </a:solidFill>
+                <a:latin typeface="Cascadia Mono" panose="020B0609020000020004" pitchFamily="49" charset="0"/>
+              </a:rPr>
+              <a:t>Length</a:t>
+            </a:r>
+            <a:r>
+              <a:rPr lang="en-US" sz="1800" dirty="0">
+                <a:solidFill>
+                  <a:srgbClr val="000000"/>
+                </a:solidFill>
+                <a:latin typeface="Cascadia Mono" panose="020B0609020000020004" pitchFamily="49" charset="0"/>
+              </a:rPr>
+              <a:t>; col++)</a:t>
+            </a:r>
+          </a:p>
+          <a:p>
+            <a:pPr marL="0" indent="0">
+              <a:buNone/>
+            </a:pPr>
+            <a:r>
+              <a:rPr lang="bg-BG" sz="1800" dirty="0">
+                <a:solidFill>
+                  <a:srgbClr val="000000"/>
+                </a:solidFill>
+                <a:latin typeface="Cascadia Mono" panose="020B0609020000020004" pitchFamily="49" charset="0"/>
+              </a:rPr>
+              <a:t>     {</a:t>
+            </a:r>
+          </a:p>
+          <a:p>
+            <a:pPr marL="0" indent="0">
+              <a:buNone/>
+            </a:pPr>
+            <a:r>
+              <a:rPr lang="en-US" sz="1800" dirty="0">
+                <a:solidFill>
+                  <a:srgbClr val="000000"/>
+                </a:solidFill>
+                <a:latin typeface="Cascadia Mono" panose="020B0609020000020004" pitchFamily="49" charset="0"/>
+              </a:rPr>
+              <a:t>         </a:t>
+            </a:r>
+            <a:r>
+              <a:rPr lang="en-US" sz="1800" dirty="0" err="1">
+                <a:solidFill>
+                  <a:schemeClr val="accent3">
+                    <a:lumMod val="75000"/>
+                  </a:schemeClr>
+                </a:solidFill>
+                <a:latin typeface="Cascadia Mono" panose="020B0609020000020004" pitchFamily="49" charset="0"/>
+              </a:rPr>
+              <a:t>Console</a:t>
+            </a:r>
+            <a:r>
+              <a:rPr lang="en-US" sz="1800" dirty="0" err="1">
+                <a:solidFill>
+                  <a:srgbClr val="000000"/>
+                </a:solidFill>
+                <a:latin typeface="Cascadia Mono" panose="020B0609020000020004" pitchFamily="49" charset="0"/>
+              </a:rPr>
+              <a:t>.</a:t>
+            </a:r>
+            <a:r>
+              <a:rPr lang="en-US" sz="1800" dirty="0" err="1">
+                <a:solidFill>
+                  <a:srgbClr val="0070C0"/>
+                </a:solidFill>
+                <a:latin typeface="Cascadia Mono" panose="020B0609020000020004" pitchFamily="49" charset="0"/>
+              </a:rPr>
+              <a:t>Write</a:t>
+            </a:r>
+            <a:r>
+              <a:rPr lang="en-US" sz="1800" dirty="0">
+                <a:solidFill>
+                  <a:srgbClr val="000000"/>
+                </a:solidFill>
+                <a:latin typeface="Cascadia Mono" panose="020B0609020000020004" pitchFamily="49" charset="0"/>
+              </a:rPr>
+              <a:t>(</a:t>
+            </a:r>
+            <a:r>
+              <a:rPr lang="en-US" sz="1800" dirty="0" err="1">
+                <a:solidFill>
+                  <a:srgbClr val="000000"/>
+                </a:solidFill>
+                <a:latin typeface="Cascadia Mono" panose="020B0609020000020004" pitchFamily="49" charset="0"/>
+              </a:rPr>
+              <a:t>jaggedArray</a:t>
+            </a:r>
+            <a:r>
+              <a:rPr lang="en-US" sz="1800" dirty="0">
+                <a:solidFill>
+                  <a:srgbClr val="000000"/>
+                </a:solidFill>
+                <a:latin typeface="Cascadia Mono" panose="020B0609020000020004" pitchFamily="49" charset="0"/>
+              </a:rPr>
+              <a:t>[</a:t>
+            </a:r>
+            <a:r>
+              <a:rPr lang="en-US" dirty="0">
+                <a:solidFill>
+                  <a:srgbClr val="000000"/>
+                </a:solidFill>
+                <a:latin typeface="Cascadia Mono" panose="020B0609020000020004" pitchFamily="49" charset="0"/>
+              </a:rPr>
+              <a:t>row</a:t>
+            </a:r>
+            <a:r>
+              <a:rPr lang="en-US" sz="1800" dirty="0">
+                <a:solidFill>
+                  <a:srgbClr val="000000"/>
+                </a:solidFill>
+                <a:latin typeface="Cascadia Mono" panose="020B0609020000020004" pitchFamily="49" charset="0"/>
+              </a:rPr>
+              <a:t>][</a:t>
+            </a:r>
+            <a:r>
+              <a:rPr lang="en-US" dirty="0">
+                <a:solidFill>
+                  <a:srgbClr val="000000"/>
+                </a:solidFill>
+                <a:latin typeface="Cascadia Mono" panose="020B0609020000020004" pitchFamily="49" charset="0"/>
+              </a:rPr>
+              <a:t>col</a:t>
+            </a:r>
+            <a:r>
+              <a:rPr lang="en-US" sz="1800" dirty="0">
+                <a:solidFill>
+                  <a:srgbClr val="000000"/>
+                </a:solidFill>
+                <a:latin typeface="Cascadia Mono" panose="020B0609020000020004" pitchFamily="49" charset="0"/>
+              </a:rPr>
+              <a:t>] + " ");</a:t>
+            </a:r>
+          </a:p>
+          <a:p>
+            <a:pPr marL="0" indent="0">
+              <a:buNone/>
+            </a:pPr>
+            <a:r>
+              <a:rPr lang="bg-BG" sz="1800" dirty="0">
+                <a:solidFill>
+                  <a:srgbClr val="000000"/>
+                </a:solidFill>
+                <a:latin typeface="Cascadia Mono" panose="020B0609020000020004" pitchFamily="49" charset="0"/>
+              </a:rPr>
+              <a:t>     }</a:t>
+            </a:r>
+          </a:p>
+          <a:p>
+            <a:endParaRPr lang="bg-BG" sz="1800" dirty="0">
+              <a:solidFill>
+                <a:srgbClr val="000000"/>
+              </a:solidFill>
+              <a:latin typeface="Cascadia Mono" panose="020B0609020000020004" pitchFamily="49" charset="0"/>
+            </a:endParaRPr>
+          </a:p>
+          <a:p>
+            <a:pPr marL="0" indent="0">
+              <a:buNone/>
+            </a:pPr>
+            <a:r>
+              <a:rPr lang="en-US" sz="1800" dirty="0">
+                <a:solidFill>
+                  <a:srgbClr val="000000"/>
+                </a:solidFill>
+                <a:latin typeface="Cascadia Mono" panose="020B0609020000020004" pitchFamily="49" charset="0"/>
+              </a:rPr>
+              <a:t>     </a:t>
+            </a:r>
+            <a:r>
+              <a:rPr lang="en-US" sz="1800" dirty="0" err="1">
+                <a:solidFill>
+                  <a:schemeClr val="accent3">
+                    <a:lumMod val="75000"/>
+                  </a:schemeClr>
+                </a:solidFill>
+                <a:latin typeface="Cascadia Mono" panose="020B0609020000020004" pitchFamily="49" charset="0"/>
+              </a:rPr>
+              <a:t>Console</a:t>
+            </a:r>
+            <a:r>
+              <a:rPr lang="en-US" sz="1800" dirty="0" err="1">
+                <a:solidFill>
+                  <a:srgbClr val="000000"/>
+                </a:solidFill>
+                <a:latin typeface="Cascadia Mono" panose="020B0609020000020004" pitchFamily="49" charset="0"/>
+              </a:rPr>
+              <a:t>.</a:t>
+            </a:r>
+            <a:r>
+              <a:rPr lang="en-US" sz="1800" dirty="0" err="1">
+                <a:solidFill>
+                  <a:srgbClr val="0070C0"/>
+                </a:solidFill>
+                <a:latin typeface="Cascadia Mono" panose="020B0609020000020004" pitchFamily="49" charset="0"/>
+              </a:rPr>
+              <a:t>WriteLine</a:t>
+            </a:r>
+            <a:r>
+              <a:rPr lang="en-US" sz="1800" dirty="0">
+                <a:solidFill>
+                  <a:srgbClr val="000000"/>
+                </a:solidFill>
+                <a:latin typeface="Cascadia Mono" panose="020B0609020000020004" pitchFamily="49" charset="0"/>
+              </a:rPr>
+              <a:t>();</a:t>
+            </a:r>
+          </a:p>
+          <a:p>
+            <a:pPr marL="0" indent="0">
+              <a:buNone/>
+            </a:pPr>
+            <a:r>
+              <a:rPr lang="bg-BG" sz="1800" dirty="0">
+                <a:solidFill>
+                  <a:srgbClr val="000000"/>
+                </a:solidFill>
+                <a:latin typeface="Cascadia Mono" panose="020B0609020000020004" pitchFamily="49" charset="0"/>
+              </a:rPr>
+              <a:t> }</a:t>
+            </a:r>
+            <a:endParaRPr lang="bg-BG" dirty="0"/>
+          </a:p>
+        </p:txBody>
+      </p:sp>
+    </p:spTree>
+    <p:extLst>
+      <p:ext uri="{BB962C8B-B14F-4D97-AF65-F5344CB8AC3E}">
+        <p14:creationId xmlns:p14="http://schemas.microsoft.com/office/powerpoint/2010/main" val="3301068194"/>
       </p:ext>
     </p:extLst>
   </p:cSld>

</xml_diff>